<commit_message>
Update 11. Graph Neural Differential Equations.pptx
Added a slide on Taxonomy of Graph Neural Differential Equations
</commit_message>
<xml_diff>
--- a/11. Graph Neural Differential Equations.pptx
+++ b/11. Graph Neural Differential Equations.pptx
@@ -957,6 +957,172 @@
     <p:extLst>
       <p:ext uri="{BB962C8B-B14F-4D97-AF65-F5344CB8AC3E}">
         <p14:creationId xmlns:p14="http://schemas.microsoft.com/office/powerpoint/2010/main" val="3006139419"/>
+      </p:ext>
+    </p:extLst>
+  </p:cSld>
+  <p:clrMapOvr>
+    <a:masterClrMapping/>
+  </p:clrMapOvr>
+</p:notes>
+</file>
+
+<file path=ppt/notesSlides/notesSlide12.xml><?xml version="1.0" encoding="utf-8"?>
+<p:notes xmlns:a="http://schemas.openxmlformats.org/drawingml/2006/main" xmlns:r="http://schemas.openxmlformats.org/officeDocument/2006/relationships" xmlns:p="http://schemas.openxmlformats.org/presentationml/2006/main">
+  <p:cSld>
+    <p:spTree>
+      <p:nvGrpSpPr>
+        <p:cNvPr id="1" name=""/>
+        <p:cNvGrpSpPr/>
+        <p:nvPr/>
+      </p:nvGrpSpPr>
+      <p:grpSpPr>
+        <a:xfrm>
+          <a:off x="0" y="0"/>
+          <a:ext cx="0" cy="0"/>
+          <a:chOff x="0" y="0"/>
+          <a:chExt cx="0" cy="0"/>
+        </a:xfrm>
+      </p:grpSpPr>
+      <p:sp>
+        <p:nvSpPr>
+          <p:cNvPr id="2" name="Slide Image Placeholder 1"/>
+          <p:cNvSpPr>
+            <a:spLocks noGrp="1" noRot="1" noChangeAspect="1"/>
+          </p:cNvSpPr>
+          <p:nvPr>
+            <p:ph type="sldImg"/>
+          </p:nvPr>
+        </p:nvSpPr>
+        <p:spPr/>
+      </p:sp>
+      <p:sp>
+        <p:nvSpPr>
+          <p:cNvPr id="3" name="Notes Placeholder 2"/>
+          <p:cNvSpPr>
+            <a:spLocks noGrp="1"/>
+          </p:cNvSpPr>
+          <p:nvPr>
+            <p:ph type="body" idx="1"/>
+          </p:nvPr>
+        </p:nvSpPr>
+        <p:spPr/>
+        <p:txBody>
+          <a:bodyPr/>
+          <a:lstStyle/>
+          <a:p>
+            <a:pPr algn="l"/>
+            <a:r>
+              <a:rPr lang="en-US" sz="1800" b="0" i="0" u="none" strike="noStrike" baseline="0" dirty="0">
+                <a:latin typeface="NimbusRomNo9L-Regu"/>
+              </a:rPr>
+              <a:t>[1] A. J. Van Der </a:t>
+            </a:r>
+            <a:r>
+              <a:rPr lang="en-US" sz="1800" b="0" i="0" u="none" strike="noStrike" baseline="0" dirty="0" err="1">
+                <a:latin typeface="NimbusRomNo9L-Regu"/>
+              </a:rPr>
+              <a:t>Schaft</a:t>
+            </a:r>
+            <a:r>
+              <a:rPr lang="en-US" sz="1800" b="0" i="0" u="none" strike="noStrike" baseline="0" dirty="0">
+                <a:latin typeface="NimbusRomNo9L-Regu"/>
+              </a:rPr>
+              <a:t> and J. M. Schumacher. </a:t>
+            </a:r>
+            <a:r>
+              <a:rPr lang="en-US" sz="1800" b="0" i="0" u="none" strike="noStrike" baseline="0" dirty="0">
+                <a:latin typeface="NimbusRomNo9L-ReguItal"/>
+              </a:rPr>
+              <a:t>An introduction to hybrid dynamical systems</a:t>
+            </a:r>
+            <a:r>
+              <a:rPr lang="en-US" sz="1800" b="0" i="0" u="none" strike="noStrike" baseline="0" dirty="0">
+                <a:latin typeface="NimbusRomNo9L-Regu"/>
+              </a:rPr>
+              <a:t>, volume</a:t>
+            </a:r>
+          </a:p>
+          <a:p>
+            <a:pPr algn="l"/>
+            <a:r>
+              <a:rPr lang="en-US" sz="1800" b="0" i="0" u="none" strike="noStrike" baseline="0" dirty="0">
+                <a:latin typeface="NimbusRomNo9L-Regu"/>
+              </a:rPr>
+              <a:t>251. Springer London, 2000.</a:t>
+            </a:r>
+          </a:p>
+          <a:p>
+            <a:pPr algn="l"/>
+            <a:r>
+              <a:rPr lang="en-US" sz="1800" b="0" i="0" u="none" strike="noStrike" baseline="0" dirty="0">
+                <a:latin typeface="NimbusRomNo9L-Regu"/>
+              </a:rPr>
+              <a:t>[2] R. Goebel, R. G. </a:t>
+            </a:r>
+            <a:r>
+              <a:rPr lang="en-US" sz="1800" b="0" i="0" u="none" strike="noStrike" baseline="0" dirty="0" err="1">
+                <a:latin typeface="NimbusRomNo9L-Regu"/>
+              </a:rPr>
+              <a:t>Sanfelice</a:t>
+            </a:r>
+            <a:r>
+              <a:rPr lang="en-US" sz="1800" b="0" i="0" u="none" strike="noStrike" baseline="0" dirty="0">
+                <a:latin typeface="NimbusRomNo9L-Regu"/>
+              </a:rPr>
+              <a:t>, and A. R. Teel. Hybrid dynamical systems. </a:t>
+            </a:r>
+            <a:r>
+              <a:rPr lang="en-US" sz="1800" b="0" i="0" u="none" strike="noStrike" baseline="0" dirty="0">
+                <a:latin typeface="NimbusRomNo9L-ReguItal"/>
+              </a:rPr>
+              <a:t>IEEE Control Systems</a:t>
+            </a:r>
+          </a:p>
+          <a:p>
+            <a:pPr algn="l"/>
+            <a:r>
+              <a:rPr lang="en-US" sz="1800" b="0" i="0" u="none" strike="noStrike" baseline="0" dirty="0">
+                <a:latin typeface="NimbusRomNo9L-ReguItal"/>
+              </a:rPr>
+              <a:t>Magazine</a:t>
+            </a:r>
+            <a:r>
+              <a:rPr lang="en-US" sz="1800" b="0" i="0" u="none" strike="noStrike" baseline="0" dirty="0">
+                <a:latin typeface="NimbusRomNo9L-Regu"/>
+              </a:rPr>
+              <a:t>, 29(2):28–93, 2009.</a:t>
+            </a:r>
+            <a:endParaRPr lang="en-US" dirty="0"/>
+          </a:p>
+        </p:txBody>
+      </p:sp>
+      <p:sp>
+        <p:nvSpPr>
+          <p:cNvPr id="4" name="Slide Number Placeholder 3"/>
+          <p:cNvSpPr>
+            <a:spLocks noGrp="1"/>
+          </p:cNvSpPr>
+          <p:nvPr>
+            <p:ph type="sldNum" sz="quarter" idx="5"/>
+          </p:nvPr>
+        </p:nvSpPr>
+        <p:spPr/>
+        <p:txBody>
+          <a:bodyPr/>
+          <a:lstStyle/>
+          <a:p>
+            <a:fld id="{9271DED1-4C91-4561-A99B-E6676363E223}" type="slidenum">
+              <a:rPr lang="en-US" smtClean="0"/>
+              <a:t>23</a:t>
+            </a:fld>
+            <a:endParaRPr lang="en-US"/>
+          </a:p>
+        </p:txBody>
+      </p:sp>
+    </p:spTree>
+    <p:extLst>
+      <p:ext uri="{BB962C8B-B14F-4D97-AF65-F5344CB8AC3E}">
+        <p14:creationId xmlns:p14="http://schemas.microsoft.com/office/powerpoint/2010/main" val="2362348002"/>
       </p:ext>
     </p:extLst>
   </p:cSld>
@@ -11262,13 +11428,13 @@
         </p:nvSpPr>
         <p:spPr>
           <a:xfrm>
-            <a:off x="2990235" y="5000369"/>
-            <a:ext cx="5369800" cy="1857632"/>
+            <a:off x="2990234" y="5000369"/>
+            <a:ext cx="6680988" cy="1857632"/>
           </a:xfrm>
         </p:spPr>
         <p:txBody>
           <a:bodyPr>
-            <a:normAutofit fontScale="77500" lnSpcReduction="20000"/>
+            <a:normAutofit/>
           </a:bodyPr>
           <a:lstStyle/>
           <a:p>
@@ -11306,27 +11472,6 @@
           </a:p>
           <a:p>
             <a:r>
-              <a:rPr lang="en-US" altLang="x-none" sz="1500" b="1" dirty="0">
-                <a:ea typeface="ＭＳ Ｐゴシック" charset="-128"/>
-              </a:rPr>
-              <a:t>Max Schumacher (</a:t>
-            </a:r>
-            <a:r>
-              <a:rPr lang="en-US" sz="1500" dirty="0">
-                <a:hlinkClick r:id="rId4"/>
-              </a:rPr>
-              <a:t>schumacher2@uni-potsdam.de</a:t>
-            </a:r>
-            <a:r>
-              <a:rPr lang="en-US" sz="1500" dirty="0"/>
-              <a:t>)</a:t>
-            </a:r>
-            <a:endParaRPr lang="en-US" altLang="x-none" sz="1500" dirty="0">
-              <a:ea typeface="ＭＳ Ｐゴシック" charset="-128"/>
-            </a:endParaRPr>
-          </a:p>
-          <a:p>
-            <a:r>
               <a:rPr lang="en-US" altLang="x-none" sz="1200" dirty="0">
                 <a:ea typeface="ＭＳ Ｐゴシック" charset="-128"/>
               </a:rPr>
@@ -11335,7 +11480,7 @@
             <a:r>
               <a:rPr lang="en-US" altLang="x-none" sz="1200" dirty="0">
                 <a:ea typeface="ＭＳ Ｐゴシック" charset="-128"/>
-                <a:hlinkClick r:id="rId5"/>
+                <a:hlinkClick r:id="rId4"/>
               </a:rPr>
               <a:t>sona.ghahremani@hpi.de</a:t>
             </a:r>
@@ -11356,7 +11501,7 @@
             <a:r>
               <a:rPr lang="en-US" altLang="x-none" sz="1200" dirty="0">
                 <a:ea typeface="ＭＳ Ｐゴシック" charset="-128"/>
-                <a:hlinkClick r:id="rId6"/>
+                <a:hlinkClick r:id="rId5"/>
               </a:rPr>
               <a:t>holger.giese@hpi.de)</a:t>
             </a:r>
@@ -19905,15 +20050,39 @@
             <p:ph type="title"/>
           </p:nvPr>
         </p:nvSpPr>
-        <p:spPr/>
+        <p:spPr>
+          <a:xfrm>
+            <a:off x="478369" y="144001"/>
+            <a:ext cx="9169401" cy="453183"/>
+          </a:xfrm>
+        </p:spPr>
         <p:txBody>
           <a:bodyPr/>
           <a:lstStyle/>
           <a:p>
             <a:r>
-              <a:rPr lang="en-US" dirty="0"/>
-              <a:t>Further Reading</a:t>
-            </a:r>
+              <a:rPr lang="en-US" sz="2000" dirty="0"/>
+              <a:t>Taxonomy of </a:t>
+            </a:r>
+            <a:r>
+              <a:rPr lang="en-US" sz="2000" dirty="0">
+                <a:latin typeface="NimbusRomNo9L-Medi"/>
+              </a:rPr>
+              <a:t>Graph Neural Ordinary Differential Equations [</a:t>
+            </a:r>
+            <a:r>
+              <a:rPr lang="en-US" sz="2000" dirty="0" err="1">
+                <a:latin typeface="NimbusRomNo9L-Medi"/>
+              </a:rPr>
+              <a:t>Poli</a:t>
+            </a:r>
+            <a:r>
+              <a:rPr lang="en-US" sz="2000" dirty="0">
+                <a:latin typeface="NimbusRomNo9L-Medi"/>
+              </a:rPr>
+              <a:t> et al. 2020]</a:t>
+            </a:r>
+            <a:endParaRPr lang="en-US" dirty="0"/>
           </a:p>
         </p:txBody>
       </p:sp>
@@ -19935,8 +20104,8 @@
         </p:nvSpPr>
         <p:spPr>
           <a:xfrm>
-            <a:off x="478369" y="1213308"/>
-            <a:ext cx="11473384" cy="2553520"/>
+            <a:off x="478370" y="1213308"/>
+            <a:ext cx="2388398" cy="664093"/>
           </a:xfrm>
         </p:spPr>
         <p:txBody>
@@ -19944,78 +20113,24 @@
           <a:lstStyle/>
           <a:p>
             <a:r>
-              <a:rPr lang="en-US" sz="1800" dirty="0" err="1">
+              <a:rPr lang="en-US" sz="1800" b="1" i="0" u="none" strike="noStrike" baseline="0" dirty="0">
                 <a:latin typeface="NimbusRomNo9L-Medi"/>
               </a:rPr>
-              <a:t>Poli</a:t>
-            </a:r>
-            <a:r>
-              <a:rPr lang="en-US" sz="1800" dirty="0">
+              <a:t>Graph </a:t>
+            </a:r>
+            <a:r>
+              <a:rPr lang="en-US" sz="1800" b="1" i="0" u="sng" strike="noStrike" baseline="0" dirty="0">
                 <a:latin typeface="NimbusRomNo9L-Medi"/>
               </a:rPr>
-              <a:t>, et al., (2020). Graph Neural Ordinary Differential Equations.</a:t>
-            </a:r>
-          </a:p>
-          <a:p>
-            <a:pPr marL="285750" indent="-285750">
-              <a:buFont typeface="Arial" panose="020B0604020202020204" pitchFamily="34" charset="0"/>
-              <a:buChar char="•"/>
-            </a:pPr>
-            <a:r>
-              <a:rPr lang="en-US" sz="1800" b="0" i="0" u="none" strike="noStrike" baseline="0" dirty="0">
+              <a:t>convolution</a:t>
+            </a:r>
+            <a:r>
+              <a:rPr lang="en-US" sz="1800" b="1" i="0" u="none" strike="noStrike" baseline="0" dirty="0">
                 <a:latin typeface="NimbusRomNo9L-Medi"/>
               </a:rPr>
-              <a:t>Graph convolution differential equations</a:t>
-            </a:r>
-          </a:p>
-          <a:p>
-            <a:pPr marL="285750" indent="-285750">
-              <a:buFont typeface="Arial" panose="020B0604020202020204" pitchFamily="34" charset="0"/>
-              <a:buChar char="•"/>
-            </a:pPr>
-            <a:r>
-              <a:rPr lang="en-US" sz="1800" b="0" i="0" u="none" strike="noStrike" baseline="0" dirty="0" err="1">
-                <a:latin typeface="NimbusRomNo9L-Medi"/>
-              </a:rPr>
-              <a:t>Spatio</a:t>
-            </a:r>
-            <a:r>
-              <a:rPr lang="en-US" sz="1800" b="0" i="0" u="none" strike="noStrike" baseline="0" dirty="0">
-                <a:latin typeface="NimbusRomNo9L-Medi"/>
-              </a:rPr>
-              <a:t>–Temporal Models</a:t>
-            </a:r>
-            <a:endParaRPr lang="en-US" sz="1800" dirty="0">
-              <a:latin typeface="NimbusRomNo9L-Medi"/>
-            </a:endParaRPr>
-          </a:p>
-          <a:p>
-            <a:pPr marL="285750" indent="-285750">
-              <a:buFont typeface="Arial" panose="020B0604020202020204" pitchFamily="34" charset="0"/>
-              <a:buChar char="•"/>
-            </a:pPr>
-            <a:r>
-              <a:rPr lang="en-US" sz="1800" b="0" i="0" u="none" strike="noStrike" baseline="0" dirty="0">
-                <a:latin typeface="NimbusRomNo9L-Medi"/>
-              </a:rPr>
-              <a:t>Autoregressive GDEs</a:t>
-            </a:r>
-          </a:p>
-          <a:p>
-            <a:pPr marL="285750" indent="-285750">
-              <a:buFont typeface="Arial" panose="020B0604020202020204" pitchFamily="34" charset="0"/>
-              <a:buChar char="•"/>
-            </a:pPr>
-            <a:endParaRPr lang="en-US" sz="1800" dirty="0">
-              <a:latin typeface="NimbusRomNo9L-Medi"/>
-            </a:endParaRPr>
-          </a:p>
-          <a:p>
-            <a:pPr marL="285750" indent="-285750">
-              <a:buFont typeface="Arial" panose="020B0604020202020204" pitchFamily="34" charset="0"/>
-              <a:buChar char="•"/>
-            </a:pPr>
-            <a:endParaRPr lang="en-US" dirty="0"/>
+              <a:t> differential equations</a:t>
+            </a:r>
+            <a:endParaRPr lang="en-US" b="1" dirty="0"/>
           </a:p>
         </p:txBody>
       </p:sp>
@@ -20048,6 +20163,1050 @@
           </a:p>
         </p:txBody>
       </p:sp>
+      <p:sp>
+        <p:nvSpPr>
+          <p:cNvPr id="6" name="TextBox 5">
+            <a:extLst>
+              <a:ext uri="{FF2B5EF4-FFF2-40B4-BE49-F238E27FC236}">
+                <a16:creationId xmlns:a16="http://schemas.microsoft.com/office/drawing/2014/main" id="{BC1BF1CC-6C7F-41A0-A30B-3FF349F1D2F7}"/>
+              </a:ext>
+            </a:extLst>
+          </p:cNvPr>
+          <p:cNvSpPr txBox="1"/>
+          <p:nvPr/>
+        </p:nvSpPr>
+        <p:spPr bwMode="gray">
+          <a:xfrm>
+            <a:off x="96795" y="6488668"/>
+            <a:ext cx="6240162" cy="338554"/>
+          </a:xfrm>
+          <a:prstGeom prst="rect">
+            <a:avLst/>
+          </a:prstGeom>
+          <a:noFill/>
+        </p:spPr>
+        <p:txBody>
+          <a:bodyPr wrap="square">
+            <a:spAutoFit/>
+          </a:bodyPr>
+          <a:lstStyle/>
+          <a:p>
+            <a:r>
+              <a:rPr lang="en-US" sz="1600" dirty="0" err="1">
+                <a:latin typeface="NimbusRomNo9L-Medi"/>
+              </a:rPr>
+              <a:t>Poli</a:t>
+            </a:r>
+            <a:r>
+              <a:rPr lang="en-US" sz="1600" dirty="0">
+                <a:latin typeface="NimbusRomNo9L-Medi"/>
+              </a:rPr>
+              <a:t>, et al., (2020). Graph Neural Ordinary Differential Equations.</a:t>
+            </a:r>
+          </a:p>
+        </p:txBody>
+      </p:sp>
+      <p:pic>
+        <p:nvPicPr>
+          <p:cNvPr id="8" name="Picture 7">
+            <a:extLst>
+              <a:ext uri="{FF2B5EF4-FFF2-40B4-BE49-F238E27FC236}">
+                <a16:creationId xmlns:a16="http://schemas.microsoft.com/office/drawing/2014/main" id="{7B39ECFD-F9CD-48CD-8646-1BFC739CA2F8}"/>
+              </a:ext>
+            </a:extLst>
+          </p:cNvPr>
+          <p:cNvPicPr>
+            <a:picLocks noChangeAspect="1"/>
+          </p:cNvPicPr>
+          <p:nvPr/>
+        </p:nvPicPr>
+        <p:blipFill>
+          <a:blip r:embed="rId3"/>
+          <a:stretch>
+            <a:fillRect/>
+          </a:stretch>
+        </p:blipFill>
+        <p:spPr>
+          <a:xfrm>
+            <a:off x="7204338" y="4621260"/>
+            <a:ext cx="3407602" cy="2109798"/>
+          </a:xfrm>
+          <a:prstGeom prst="rect">
+            <a:avLst/>
+          </a:prstGeom>
+        </p:spPr>
+      </p:pic>
+      <p:pic>
+        <p:nvPicPr>
+          <p:cNvPr id="10" name="Picture 9">
+            <a:extLst>
+              <a:ext uri="{FF2B5EF4-FFF2-40B4-BE49-F238E27FC236}">
+                <a16:creationId xmlns:a16="http://schemas.microsoft.com/office/drawing/2014/main" id="{EF046027-72C4-468F-B9ED-2FBE1F09EB80}"/>
+              </a:ext>
+            </a:extLst>
+          </p:cNvPr>
+          <p:cNvPicPr>
+            <a:picLocks noChangeAspect="1"/>
+          </p:cNvPicPr>
+          <p:nvPr/>
+        </p:nvPicPr>
+        <p:blipFill>
+          <a:blip r:embed="rId4"/>
+          <a:stretch>
+            <a:fillRect/>
+          </a:stretch>
+        </p:blipFill>
+        <p:spPr>
+          <a:xfrm>
+            <a:off x="2523283" y="4835171"/>
+            <a:ext cx="4447083" cy="889417"/>
+          </a:xfrm>
+          <a:prstGeom prst="rect">
+            <a:avLst/>
+          </a:prstGeom>
+        </p:spPr>
+      </p:pic>
+      <p:sp>
+        <p:nvSpPr>
+          <p:cNvPr id="12" name="TextBox 11">
+            <a:extLst>
+              <a:ext uri="{FF2B5EF4-FFF2-40B4-BE49-F238E27FC236}">
+                <a16:creationId xmlns:a16="http://schemas.microsoft.com/office/drawing/2014/main" id="{B5ACC1B9-5D56-470F-99C5-09D6BBECA8EB}"/>
+              </a:ext>
+            </a:extLst>
+          </p:cNvPr>
+          <p:cNvSpPr txBox="1"/>
+          <p:nvPr/>
+        </p:nvSpPr>
+        <p:spPr bwMode="gray">
+          <a:xfrm>
+            <a:off x="343927" y="5037757"/>
+            <a:ext cx="2341605" cy="369332"/>
+          </a:xfrm>
+          <a:prstGeom prst="rect">
+            <a:avLst/>
+          </a:prstGeom>
+          <a:noFill/>
+        </p:spPr>
+        <p:txBody>
+          <a:bodyPr wrap="square">
+            <a:spAutoFit/>
+          </a:bodyPr>
+          <a:lstStyle/>
+          <a:p>
+            <a:r>
+              <a:rPr lang="en-US" sz="1800" b="1" i="0" u="none" strike="noStrike" baseline="0" dirty="0">
+                <a:latin typeface="NimbusRomNo9L-Medi"/>
+              </a:rPr>
+              <a:t>Autoregressive GDEs</a:t>
+            </a:r>
+          </a:p>
+        </p:txBody>
+      </p:sp>
+      <p:sp>
+        <p:nvSpPr>
+          <p:cNvPr id="14" name="TextBox 13">
+            <a:extLst>
+              <a:ext uri="{FF2B5EF4-FFF2-40B4-BE49-F238E27FC236}">
+                <a16:creationId xmlns:a16="http://schemas.microsoft.com/office/drawing/2014/main" id="{79AD30C2-A308-470F-A614-746D72270F92}"/>
+              </a:ext>
+            </a:extLst>
+          </p:cNvPr>
+          <p:cNvSpPr txBox="1"/>
+          <p:nvPr/>
+        </p:nvSpPr>
+        <p:spPr bwMode="gray">
+          <a:xfrm>
+            <a:off x="10031236" y="4647660"/>
+            <a:ext cx="2183482" cy="664081"/>
+          </a:xfrm>
+          <a:prstGeom prst="rect">
+            <a:avLst/>
+          </a:prstGeom>
+          <a:noFill/>
+        </p:spPr>
+        <p:txBody>
+          <a:bodyPr wrap="square">
+            <a:spAutoFit/>
+          </a:bodyPr>
+          <a:lstStyle/>
+          <a:p>
+            <a:r>
+              <a:rPr lang="en-US" sz="1800" b="0" i="0" u="none" strike="noStrike" baseline="0" dirty="0">
+                <a:latin typeface="NimbusRomNo9L-Medi"/>
+              </a:rPr>
+              <a:t>Autoregressive as Hybrid Automata</a:t>
+            </a:r>
+            <a:endParaRPr lang="en-US" dirty="0"/>
+          </a:p>
+        </p:txBody>
+      </p:sp>
+      <p:sp>
+        <p:nvSpPr>
+          <p:cNvPr id="16" name="TextBox 15">
+            <a:extLst>
+              <a:ext uri="{FF2B5EF4-FFF2-40B4-BE49-F238E27FC236}">
+                <a16:creationId xmlns:a16="http://schemas.microsoft.com/office/drawing/2014/main" id="{991FC310-E6D8-4F23-A71B-3B3A320F8DE3}"/>
+              </a:ext>
+            </a:extLst>
+          </p:cNvPr>
+          <p:cNvSpPr txBox="1"/>
+          <p:nvPr/>
+        </p:nvSpPr>
+        <p:spPr bwMode="gray">
+          <a:xfrm>
+            <a:off x="343927" y="2973824"/>
+            <a:ext cx="2679356" cy="646331"/>
+          </a:xfrm>
+          <a:prstGeom prst="rect">
+            <a:avLst/>
+          </a:prstGeom>
+          <a:noFill/>
+        </p:spPr>
+        <p:txBody>
+          <a:bodyPr wrap="square">
+            <a:spAutoFit/>
+          </a:bodyPr>
+          <a:lstStyle/>
+          <a:p>
+            <a:r>
+              <a:rPr lang="en-US" sz="1800" b="1" i="0" u="none" strike="noStrike" baseline="0" dirty="0" err="1">
+                <a:latin typeface="NimbusRomNo9L-Medi"/>
+              </a:rPr>
+              <a:t>Spatio</a:t>
+            </a:r>
+            <a:r>
+              <a:rPr lang="en-US" sz="1800" b="1" i="0" u="none" strike="noStrike" baseline="0" dirty="0">
+                <a:latin typeface="NimbusRomNo9L-Medi"/>
+              </a:rPr>
+              <a:t>–Temporal Models</a:t>
+            </a:r>
+          </a:p>
+          <a:p>
+            <a:r>
+              <a:rPr lang="en-US" dirty="0">
+                <a:latin typeface="NimbusRomNo9L-Medi"/>
+              </a:rPr>
+              <a:t>(dynamical system)</a:t>
+            </a:r>
+          </a:p>
+        </p:txBody>
+      </p:sp>
+      <p:pic>
+        <p:nvPicPr>
+          <p:cNvPr id="18" name="Picture 17">
+            <a:extLst>
+              <a:ext uri="{FF2B5EF4-FFF2-40B4-BE49-F238E27FC236}">
+                <a16:creationId xmlns:a16="http://schemas.microsoft.com/office/drawing/2014/main" id="{C9D7B03A-34B1-484E-8CD7-F4CA14B8B2FA}"/>
+              </a:ext>
+            </a:extLst>
+          </p:cNvPr>
+          <p:cNvPicPr>
+            <a:picLocks noChangeAspect="1"/>
+          </p:cNvPicPr>
+          <p:nvPr/>
+        </p:nvPicPr>
+        <p:blipFill>
+          <a:blip r:embed="rId5"/>
+          <a:stretch>
+            <a:fillRect/>
+          </a:stretch>
+        </p:blipFill>
+        <p:spPr>
+          <a:xfrm>
+            <a:off x="3297477" y="2793553"/>
+            <a:ext cx="3769911" cy="635447"/>
+          </a:xfrm>
+          <a:prstGeom prst="rect">
+            <a:avLst/>
+          </a:prstGeom>
+        </p:spPr>
+      </p:pic>
+      <p:sp>
+        <p:nvSpPr>
+          <p:cNvPr id="20" name="TextBox 19">
+            <a:extLst>
+              <a:ext uri="{FF2B5EF4-FFF2-40B4-BE49-F238E27FC236}">
+                <a16:creationId xmlns:a16="http://schemas.microsoft.com/office/drawing/2014/main" id="{2FC45CB5-5C32-40C9-92F1-0AECF7D5B8F4}"/>
+              </a:ext>
+            </a:extLst>
+          </p:cNvPr>
+          <p:cNvSpPr txBox="1"/>
+          <p:nvPr/>
+        </p:nvSpPr>
+        <p:spPr bwMode="gray">
+          <a:xfrm>
+            <a:off x="7521145" y="2736736"/>
+            <a:ext cx="4353306" cy="1477328"/>
+          </a:xfrm>
+          <a:prstGeom prst="rect">
+            <a:avLst/>
+          </a:prstGeom>
+          <a:noFill/>
+        </p:spPr>
+        <p:txBody>
+          <a:bodyPr wrap="square">
+            <a:spAutoFit/>
+          </a:bodyPr>
+          <a:lstStyle/>
+          <a:p>
+            <a:pPr marL="285750" indent="-285750" algn="l">
+              <a:buFont typeface="Arial" panose="020B0604020202020204" pitchFamily="34" charset="0"/>
+              <a:buChar char="•"/>
+            </a:pPr>
+            <a:r>
+              <a:rPr lang="en-US" sz="1800" b="0" i="0" u="none" strike="noStrike" baseline="0" dirty="0">
+                <a:latin typeface="NimbusRomNo9L-Regu"/>
+              </a:rPr>
+              <a:t>GDE smoothly steers the latent node features between two time instants </a:t>
+            </a:r>
+            <a:endParaRPr lang="en-US" dirty="0">
+              <a:latin typeface="NimbusRomNo9L-Regu"/>
+            </a:endParaRPr>
+          </a:p>
+          <a:p>
+            <a:pPr marL="285750" indent="-285750" algn="l">
+              <a:buFont typeface="Arial" panose="020B0604020202020204" pitchFamily="34" charset="0"/>
+              <a:buChar char="•"/>
+            </a:pPr>
+            <a:r>
+              <a:rPr lang="en-US" sz="1800" b="0" i="0" u="none" strike="noStrike" baseline="0" dirty="0">
+                <a:latin typeface="NimbusRomNo9L-Regu"/>
+              </a:rPr>
+              <a:t>apply some discrete operator</a:t>
+            </a:r>
+            <a:r>
+              <a:rPr lang="en-US" dirty="0">
+                <a:latin typeface="NimbusRomNo9L-Regu"/>
+              </a:rPr>
+              <a:t> which produces a </a:t>
+            </a:r>
+            <a:r>
+              <a:rPr lang="en-US" sz="1800" b="0" i="0" u="none" strike="noStrike" baseline="0" dirty="0">
+                <a:latin typeface="NimbusRomNo9L-Regu"/>
+              </a:rPr>
+              <a:t>“jump” of </a:t>
+            </a:r>
+            <a:r>
+              <a:rPr lang="en-US" sz="1800" b="0" i="0" u="none" strike="noStrike" baseline="0" dirty="0">
+                <a:latin typeface="CMBX10"/>
+              </a:rPr>
+              <a:t>H </a:t>
+            </a:r>
+            <a:endParaRPr lang="en-US" dirty="0">
+              <a:latin typeface="CMBX10"/>
+            </a:endParaRPr>
+          </a:p>
+          <a:p>
+            <a:pPr marL="285750" indent="-285750" algn="l">
+              <a:buFont typeface="Arial" panose="020B0604020202020204" pitchFamily="34" charset="0"/>
+              <a:buChar char="•"/>
+            </a:pPr>
+            <a:r>
+              <a:rPr lang="en-US" sz="1800" b="0" i="0" u="none" strike="noStrike" baseline="0" dirty="0">
+                <a:latin typeface="CMBX10"/>
+              </a:rPr>
+              <a:t>H is processed by </a:t>
+            </a:r>
+            <a:r>
+              <a:rPr lang="en-US" sz="1800" b="0" i="0" u="none" strike="noStrike" baseline="0" dirty="0">
+                <a:latin typeface="NimbusRomNo9L-Regu"/>
+              </a:rPr>
+              <a:t>an output layer. </a:t>
+            </a:r>
+          </a:p>
+        </p:txBody>
+      </p:sp>
+      <p:sp>
+        <p:nvSpPr>
+          <p:cNvPr id="22" name="TextBox 21">
+            <a:extLst>
+              <a:ext uri="{FF2B5EF4-FFF2-40B4-BE49-F238E27FC236}">
+                <a16:creationId xmlns:a16="http://schemas.microsoft.com/office/drawing/2014/main" id="{37848908-7736-4FB7-81ED-C1C4E28195D8}"/>
+              </a:ext>
+            </a:extLst>
+          </p:cNvPr>
+          <p:cNvSpPr txBox="1"/>
+          <p:nvPr/>
+        </p:nvSpPr>
+        <p:spPr bwMode="gray">
+          <a:xfrm>
+            <a:off x="2988276" y="3403329"/>
+            <a:ext cx="4718612" cy="646331"/>
+          </a:xfrm>
+          <a:prstGeom prst="rect">
+            <a:avLst/>
+          </a:prstGeom>
+          <a:noFill/>
+        </p:spPr>
+        <p:txBody>
+          <a:bodyPr wrap="square">
+            <a:spAutoFit/>
+          </a:bodyPr>
+          <a:lstStyle/>
+          <a:p>
+            <a:r>
+              <a:rPr lang="en-US" sz="1800" b="0" i="0" u="none" strike="noStrike" baseline="0" dirty="0">
+                <a:latin typeface="NimbusRomNo9L-Medi"/>
+              </a:rPr>
+              <a:t>The solutions </a:t>
+            </a:r>
+            <a:r>
+              <a:rPr lang="en-US" dirty="0">
+                <a:latin typeface="NimbusRomNo9L-Medi"/>
+              </a:rPr>
+              <a:t>of </a:t>
+            </a:r>
+            <a:r>
+              <a:rPr lang="en-US" sz="1800" b="0" i="0" u="none" strike="noStrike" baseline="0" dirty="0">
+                <a:latin typeface="NimbusRomNo9L-Medi"/>
+              </a:rPr>
+              <a:t>these models are also called hybrid arcs see [1][2] on </a:t>
+            </a:r>
+            <a:r>
+              <a:rPr lang="en-US" dirty="0">
+                <a:latin typeface="NimbusRomNo9L-Medi"/>
+              </a:rPr>
+              <a:t>slides nodes</a:t>
+            </a:r>
+            <a:endParaRPr lang="en-US" sz="1800" b="0" i="0" u="none" strike="noStrike" baseline="0" dirty="0">
+              <a:latin typeface="NimbusRomNo9L-Medi"/>
+            </a:endParaRPr>
+          </a:p>
+        </p:txBody>
+      </p:sp>
+      <p:pic>
+        <p:nvPicPr>
+          <p:cNvPr id="24" name="Picture 23">
+            <a:extLst>
+              <a:ext uri="{FF2B5EF4-FFF2-40B4-BE49-F238E27FC236}">
+                <a16:creationId xmlns:a16="http://schemas.microsoft.com/office/drawing/2014/main" id="{EBB4D949-CB46-441F-A974-A7B8D4FCDE4A}"/>
+              </a:ext>
+            </a:extLst>
+          </p:cNvPr>
+          <p:cNvPicPr>
+            <a:picLocks noChangeAspect="1"/>
+          </p:cNvPicPr>
+          <p:nvPr/>
+        </p:nvPicPr>
+        <p:blipFill>
+          <a:blip r:embed="rId6"/>
+          <a:stretch>
+            <a:fillRect/>
+          </a:stretch>
+        </p:blipFill>
+        <p:spPr>
+          <a:xfrm>
+            <a:off x="3103842" y="1428181"/>
+            <a:ext cx="3285963" cy="338062"/>
+          </a:xfrm>
+          <a:prstGeom prst="rect">
+            <a:avLst/>
+          </a:prstGeom>
+        </p:spPr>
+      </p:pic>
+      <mc:AlternateContent xmlns:mc="http://schemas.openxmlformats.org/markup-compatibility/2006">
+        <mc:Choice xmlns:a14="http://schemas.microsoft.com/office/drawing/2010/main" Requires="a14">
+          <p:sp>
+            <p:nvSpPr>
+              <p:cNvPr id="26" name="TextBox 25">
+                <a:extLst>
+                  <a:ext uri="{FF2B5EF4-FFF2-40B4-BE49-F238E27FC236}">
+                    <a16:creationId xmlns:a16="http://schemas.microsoft.com/office/drawing/2014/main" id="{D9D3B946-55B6-4278-91B7-DC0902B00637}"/>
+                  </a:ext>
+                </a:extLst>
+              </p:cNvPr>
+              <p:cNvSpPr txBox="1"/>
+              <p:nvPr/>
+            </p:nvSpPr>
+            <p:spPr bwMode="gray">
+              <a:xfrm>
+                <a:off x="2975919" y="1815590"/>
+                <a:ext cx="3474308" cy="861774"/>
+              </a:xfrm>
+              <a:prstGeom prst="rect">
+                <a:avLst/>
+              </a:prstGeom>
+              <a:noFill/>
+            </p:spPr>
+            <p:txBody>
+              <a:bodyPr wrap="square">
+                <a:spAutoFit/>
+              </a:bodyPr>
+              <a:lstStyle/>
+              <a:p>
+                <a14:m>
+                  <m:oMath xmlns:m="http://schemas.openxmlformats.org/officeDocument/2006/math">
+                    <m:sSub>
+                      <m:sSubPr>
+                        <m:ctrlPr>
+                          <a:rPr lang="en-US" sz="1600" b="0" i="1" smtClean="0">
+                            <a:latin typeface="Cambria Math" panose="02040503050406030204" pitchFamily="18" charset="0"/>
+                          </a:rPr>
+                        </m:ctrlPr>
+                      </m:sSubPr>
+                      <m:e>
+                        <m:r>
+                          <a:rPr lang="en-US" sz="1600" b="0" i="1" smtClean="0">
+                            <a:latin typeface="Cambria Math" panose="02040503050406030204" pitchFamily="18" charset="0"/>
+                          </a:rPr>
+                          <m:t>𝐿</m:t>
+                        </m:r>
+                      </m:e>
+                      <m:sub>
+                        <m:r>
+                          <a:rPr lang="en-US" sz="1600" b="0" i="1" smtClean="0">
+                            <a:latin typeface="Cambria Math" panose="02040503050406030204" pitchFamily="18" charset="0"/>
+                          </a:rPr>
+                          <m:t>𝐺</m:t>
+                        </m:r>
+                      </m:sub>
+                    </m:sSub>
+                  </m:oMath>
+                </a14:m>
+                <a:r>
+                  <a:rPr lang="en-US" sz="1600" b="0" dirty="0"/>
+                  <a:t> is the graph Laplacian, </a:t>
+                </a:r>
+                <a14:m>
+                  <m:oMath xmlns:m="http://schemas.openxmlformats.org/officeDocument/2006/math">
+                    <m:r>
+                      <a:rPr lang="en-US" sz="1600" b="0" i="1" smtClean="0">
+                        <a:latin typeface="Cambria Math" panose="02040503050406030204" pitchFamily="18" charset="0"/>
+                      </a:rPr>
+                      <m:t>𝜎</m:t>
+                    </m:r>
+                  </m:oMath>
+                </a14:m>
+                <a:r>
+                  <a:rPr lang="en-US" sz="1600" b="0" dirty="0"/>
+                  <a:t> is a non-linear activation function</a:t>
+                </a:r>
+              </a:p>
+              <a:p>
+                <a:endParaRPr lang="en-US" dirty="0"/>
+              </a:p>
+            </p:txBody>
+          </p:sp>
+        </mc:Choice>
+        <mc:Fallback>
+          <p:sp>
+            <p:nvSpPr>
+              <p:cNvPr id="26" name="TextBox 25">
+                <a:extLst>
+                  <a:ext uri="{FF2B5EF4-FFF2-40B4-BE49-F238E27FC236}">
+                    <a16:creationId xmlns:a16="http://schemas.microsoft.com/office/drawing/2014/main" id="{D9D3B946-55B6-4278-91B7-DC0902B00637}"/>
+                  </a:ext>
+                </a:extLst>
+              </p:cNvPr>
+              <p:cNvSpPr txBox="1">
+                <a:spLocks noRot="1" noChangeAspect="1" noMove="1" noResize="1" noEditPoints="1" noAdjustHandles="1" noChangeArrowheads="1" noChangeShapeType="1" noTextEdit="1"/>
+              </p:cNvSpPr>
+              <p:nvPr/>
+            </p:nvSpPr>
+            <p:spPr bwMode="gray">
+              <a:xfrm>
+                <a:off x="2975919" y="1815590"/>
+                <a:ext cx="3474308" cy="861774"/>
+              </a:xfrm>
+              <a:prstGeom prst="rect">
+                <a:avLst/>
+              </a:prstGeom>
+              <a:blipFill>
+                <a:blip r:embed="rId7"/>
+                <a:stretch>
+                  <a:fillRect l="-877" t="-2128" r="-1404"/>
+                </a:stretch>
+              </a:blipFill>
+            </p:spPr>
+            <p:txBody>
+              <a:bodyPr/>
+              <a:lstStyle/>
+              <a:p>
+                <a:r>
+                  <a:rPr lang="en-US">
+                    <a:noFill/>
+                  </a:rPr>
+                  <a:t> </a:t>
+                </a:r>
+              </a:p>
+            </p:txBody>
+          </p:sp>
+        </mc:Fallback>
+      </mc:AlternateContent>
+      <p:sp>
+        <p:nvSpPr>
+          <p:cNvPr id="27" name="Left Brace 26">
+            <a:extLst>
+              <a:ext uri="{FF2B5EF4-FFF2-40B4-BE49-F238E27FC236}">
+                <a16:creationId xmlns:a16="http://schemas.microsoft.com/office/drawing/2014/main" id="{BFD430FD-C09B-49DB-A049-9DE682365A47}"/>
+              </a:ext>
+            </a:extLst>
+          </p:cNvPr>
+          <p:cNvSpPr/>
+          <p:nvPr/>
+        </p:nvSpPr>
+        <p:spPr bwMode="gray">
+          <a:xfrm rot="5400000">
+            <a:off x="5562799" y="850007"/>
+            <a:ext cx="177545" cy="1053611"/>
+          </a:xfrm>
+          <a:prstGeom prst="leftBrace">
+            <a:avLst/>
+          </a:prstGeom>
+          <a:ln>
+            <a:solidFill>
+              <a:schemeClr val="accent1"/>
+            </a:solidFill>
+          </a:ln>
+        </p:spPr>
+        <p:style>
+          <a:lnRef idx="1">
+            <a:schemeClr val="accent1"/>
+          </a:lnRef>
+          <a:fillRef idx="0">
+            <a:schemeClr val="accent1"/>
+          </a:fillRef>
+          <a:effectRef idx="0">
+            <a:schemeClr val="accent1"/>
+          </a:effectRef>
+          <a:fontRef idx="minor">
+            <a:schemeClr val="tx1"/>
+          </a:fontRef>
+        </p:style>
+        <p:txBody>
+          <a:bodyPr rtlCol="0" anchor="ctr"/>
+          <a:lstStyle/>
+          <a:p>
+            <a:pPr algn="ctr"/>
+            <a:endParaRPr lang="en-US"/>
+          </a:p>
+        </p:txBody>
+      </p:sp>
+      <p:cxnSp>
+        <p:nvCxnSpPr>
+          <p:cNvPr id="29" name="Connector: Elbow 28">
+            <a:extLst>
+              <a:ext uri="{FF2B5EF4-FFF2-40B4-BE49-F238E27FC236}">
+                <a16:creationId xmlns:a16="http://schemas.microsoft.com/office/drawing/2014/main" id="{D61CF541-BAC9-4B70-B043-A63316F74350}"/>
+              </a:ext>
+            </a:extLst>
+          </p:cNvPr>
+          <p:cNvCxnSpPr>
+            <a:cxnSpLocks/>
+            <a:stCxn id="27" idx="1"/>
+            <a:endCxn id="32" idx="1"/>
+          </p:cNvCxnSpPr>
+          <p:nvPr/>
+        </p:nvCxnSpPr>
+        <p:spPr bwMode="gray">
+          <a:xfrm rot="5400000" flipH="1" flipV="1">
+            <a:off x="6373474" y="379265"/>
+            <a:ext cx="186872" cy="1630678"/>
+          </a:xfrm>
+          <a:prstGeom prst="bentConnector4">
+            <a:avLst>
+              <a:gd name="adj1" fmla="val 100289"/>
+              <a:gd name="adj2" fmla="val 52722"/>
+            </a:avLst>
+          </a:prstGeom>
+          <a:ln>
+            <a:solidFill>
+              <a:schemeClr val="accent1"/>
+            </a:solidFill>
+            <a:tailEnd type="triangle"/>
+          </a:ln>
+        </p:spPr>
+        <p:style>
+          <a:lnRef idx="1">
+            <a:schemeClr val="accent1"/>
+          </a:lnRef>
+          <a:fillRef idx="0">
+            <a:schemeClr val="accent1"/>
+          </a:fillRef>
+          <a:effectRef idx="0">
+            <a:schemeClr val="accent1"/>
+          </a:effectRef>
+          <a:fontRef idx="minor">
+            <a:schemeClr val="tx1"/>
+          </a:fontRef>
+        </p:style>
+      </p:cxnSp>
+      <mc:AlternateContent xmlns:mc="http://schemas.openxmlformats.org/markup-compatibility/2006">
+        <mc:Choice xmlns:a14="http://schemas.microsoft.com/office/drawing/2010/main" Requires="a14">
+          <p:sp>
+            <p:nvSpPr>
+              <p:cNvPr id="30" name="TextBox 29">
+                <a:extLst>
+                  <a:ext uri="{FF2B5EF4-FFF2-40B4-BE49-F238E27FC236}">
+                    <a16:creationId xmlns:a16="http://schemas.microsoft.com/office/drawing/2014/main" id="{E6249CE9-F350-4E3A-86F2-F143C6A2BC80}"/>
+                  </a:ext>
+                </a:extLst>
+              </p:cNvPr>
+              <p:cNvSpPr txBox="1"/>
+              <p:nvPr/>
+            </p:nvSpPr>
+            <p:spPr bwMode="gray">
+              <a:xfrm>
+                <a:off x="7521145" y="1428181"/>
+                <a:ext cx="4430611" cy="914400"/>
+              </a:xfrm>
+              <a:prstGeom prst="rect">
+                <a:avLst/>
+              </a:prstGeom>
+              <a:noFill/>
+            </p:spPr>
+            <p:txBody>
+              <a:bodyPr wrap="none" lIns="0" tIns="0" rIns="0" bIns="0" rtlCol="0">
+                <a:noAutofit/>
+              </a:bodyPr>
+              <a:lstStyle/>
+              <a:p>
+                <a:pPr>
+                  <a:spcBef>
+                    <a:spcPts val="300"/>
+                  </a:spcBef>
+                  <a:spcAft>
+                    <a:spcPts val="300"/>
+                  </a:spcAft>
+                  <a:buClr>
+                    <a:schemeClr val="accent1"/>
+                  </a:buClr>
+                  <a:buSzPct val="90000"/>
+                </a:pPr>
+                <a:r>
+                  <a:rPr lang="en-US" sz="1200" dirty="0"/>
+                  <a:t>Where, </a:t>
+                </a:r>
+                <a14:m>
+                  <m:oMath xmlns:m="http://schemas.openxmlformats.org/officeDocument/2006/math">
+                    <m:sSub>
+                      <m:sSubPr>
+                        <m:ctrlPr>
+                          <a:rPr lang="en-US" sz="1200" b="0" i="1" dirty="0" smtClean="0">
+                            <a:latin typeface="Cambria Math" panose="02040503050406030204" pitchFamily="18" charset="0"/>
+                          </a:rPr>
+                        </m:ctrlPr>
+                      </m:sSubPr>
+                      <m:e>
+                        <m:r>
+                          <m:rPr>
+                            <m:sty m:val="p"/>
+                          </m:rPr>
+                          <a:rPr lang="en-US" sz="1200" b="0" i="0" dirty="0" smtClean="0">
+                            <a:latin typeface="Cambria Math" panose="02040503050406030204" pitchFamily="18" charset="0"/>
+                          </a:rPr>
+                          <m:t>C</m:t>
+                        </m:r>
+                      </m:e>
+                      <m:sub>
+                        <m:r>
+                          <a:rPr lang="en-US" sz="1200" i="1" dirty="0" smtClean="0">
+                            <a:latin typeface="Cambria Math" panose="02040503050406030204" pitchFamily="18" charset="0"/>
+                          </a:rPr>
+                          <m:t>𝐺</m:t>
+                        </m:r>
+                      </m:sub>
+                    </m:sSub>
+                  </m:oMath>
+                </a14:m>
+                <a:r>
+                  <a:rPr lang="en-US" sz="1200" dirty="0"/>
+                  <a:t> is the Graph Convolution operator.</a:t>
+                </a:r>
+              </a:p>
+              <a:p>
+                <a:pPr>
+                  <a:spcBef>
+                    <a:spcPts val="300"/>
+                  </a:spcBef>
+                  <a:spcAft>
+                    <a:spcPts val="300"/>
+                  </a:spcAft>
+                  <a:buClr>
+                    <a:schemeClr val="accent1"/>
+                  </a:buClr>
+                  <a:buSzPct val="90000"/>
+                </a:pPr>
+                <a:r>
+                  <a:rPr lang="en-US" sz="1200" dirty="0"/>
+                  <a:t>Therefore, a continuous GCN is multi-layer convolution </a:t>
+                </a:r>
+              </a:p>
+              <a:p>
+                <a:pPr>
+                  <a:spcBef>
+                    <a:spcPts val="300"/>
+                  </a:spcBef>
+                  <a:spcAft>
+                    <a:spcPts val="300"/>
+                  </a:spcAft>
+                  <a:buClr>
+                    <a:schemeClr val="accent1"/>
+                  </a:buClr>
+                  <a:buSzPct val="90000"/>
+                </a:pPr>
+                <a:r>
+                  <a:rPr lang="en-US" sz="1200" dirty="0"/>
+                  <a:t>defined by a function </a:t>
+                </a:r>
+                <a14:m>
+                  <m:oMath xmlns:m="http://schemas.openxmlformats.org/officeDocument/2006/math">
+                    <m:sSub>
+                      <m:sSubPr>
+                        <m:ctrlPr>
+                          <a:rPr lang="en-US" sz="1200" b="0" i="1" smtClean="0">
+                            <a:latin typeface="Cambria Math" panose="02040503050406030204" pitchFamily="18" charset="0"/>
+                          </a:rPr>
+                        </m:ctrlPr>
+                      </m:sSubPr>
+                      <m:e>
+                        <m:r>
+                          <a:rPr lang="en-US" sz="1200" b="0" i="1" smtClean="0">
+                            <a:latin typeface="Cambria Math" panose="02040503050406030204" pitchFamily="18" charset="0"/>
+                          </a:rPr>
+                          <m:t>𝐹</m:t>
+                        </m:r>
+                      </m:e>
+                      <m:sub>
+                        <m:r>
+                          <a:rPr lang="en-US" sz="1200" b="0" i="1" smtClean="0">
+                            <a:latin typeface="Cambria Math" panose="02040503050406030204" pitchFamily="18" charset="0"/>
+                          </a:rPr>
+                          <m:t>𝐺</m:t>
+                        </m:r>
+                      </m:sub>
+                    </m:sSub>
+                    <m:r>
+                      <a:rPr lang="en-US" sz="1200" b="0" i="1" smtClean="0">
+                        <a:latin typeface="Cambria Math" panose="02040503050406030204" pitchFamily="18" charset="0"/>
+                      </a:rPr>
+                      <m:t>:</m:t>
+                    </m:r>
+                  </m:oMath>
+                </a14:m>
+                <a:endParaRPr lang="en-US" sz="1200" dirty="0"/>
+              </a:p>
+              <a:p>
+                <a:pPr>
+                  <a:spcBef>
+                    <a:spcPts val="300"/>
+                  </a:spcBef>
+                  <a:spcAft>
+                    <a:spcPts val="300"/>
+                  </a:spcAft>
+                  <a:buClr>
+                    <a:schemeClr val="accent1"/>
+                  </a:buClr>
+                  <a:buSzPct val="90000"/>
+                </a:pPr>
+                <a:endParaRPr lang="en-US" sz="1200" dirty="0"/>
+              </a:p>
+              <a:p>
+                <a:pPr>
+                  <a:spcBef>
+                    <a:spcPts val="300"/>
+                  </a:spcBef>
+                  <a:spcAft>
+                    <a:spcPts val="300"/>
+                  </a:spcAft>
+                  <a:buClr>
+                    <a:schemeClr val="accent1"/>
+                  </a:buClr>
+                  <a:buSzPct val="90000"/>
+                </a:pPr>
+                <a:endParaRPr lang="en-US" sz="1200" dirty="0"/>
+              </a:p>
+            </p:txBody>
+          </p:sp>
+        </mc:Choice>
+        <mc:Fallback>
+          <p:sp>
+            <p:nvSpPr>
+              <p:cNvPr id="30" name="TextBox 29">
+                <a:extLst>
+                  <a:ext uri="{FF2B5EF4-FFF2-40B4-BE49-F238E27FC236}">
+                    <a16:creationId xmlns:a16="http://schemas.microsoft.com/office/drawing/2014/main" id="{E6249CE9-F350-4E3A-86F2-F143C6A2BC80}"/>
+                  </a:ext>
+                </a:extLst>
+              </p:cNvPr>
+              <p:cNvSpPr txBox="1">
+                <a:spLocks noRot="1" noChangeAspect="1" noMove="1" noResize="1" noEditPoints="1" noAdjustHandles="1" noChangeArrowheads="1" noChangeShapeType="1" noTextEdit="1"/>
+              </p:cNvSpPr>
+              <p:nvPr/>
+            </p:nvSpPr>
+            <p:spPr bwMode="gray">
+              <a:xfrm>
+                <a:off x="7521145" y="1428181"/>
+                <a:ext cx="4430611" cy="914400"/>
+              </a:xfrm>
+              <a:prstGeom prst="rect">
+                <a:avLst/>
+              </a:prstGeom>
+              <a:blipFill>
+                <a:blip r:embed="rId8"/>
+                <a:stretch>
+                  <a:fillRect l="-2201" t="-5333"/>
+                </a:stretch>
+              </a:blipFill>
+            </p:spPr>
+            <p:txBody>
+              <a:bodyPr/>
+              <a:lstStyle/>
+              <a:p>
+                <a:r>
+                  <a:rPr lang="en-US">
+                    <a:noFill/>
+                  </a:rPr>
+                  <a:t> </a:t>
+                </a:r>
+              </a:p>
+            </p:txBody>
+          </p:sp>
+        </mc:Fallback>
+      </mc:AlternateContent>
+      <p:pic>
+        <p:nvPicPr>
+          <p:cNvPr id="32" name="Picture 31">
+            <a:extLst>
+              <a:ext uri="{FF2B5EF4-FFF2-40B4-BE49-F238E27FC236}">
+                <a16:creationId xmlns:a16="http://schemas.microsoft.com/office/drawing/2014/main" id="{8BB4314B-3C2B-4CD9-A95C-BD3EB097507D}"/>
+              </a:ext>
+            </a:extLst>
+          </p:cNvPr>
+          <p:cNvPicPr>
+            <a:picLocks noChangeAspect="1"/>
+          </p:cNvPicPr>
+          <p:nvPr/>
+        </p:nvPicPr>
+        <p:blipFill>
+          <a:blip r:embed="rId9"/>
+          <a:stretch>
+            <a:fillRect/>
+          </a:stretch>
+        </p:blipFill>
+        <p:spPr>
+          <a:xfrm>
+            <a:off x="7282249" y="965091"/>
+            <a:ext cx="2258870" cy="272153"/>
+          </a:xfrm>
+          <a:prstGeom prst="rect">
+            <a:avLst/>
+          </a:prstGeom>
+        </p:spPr>
+      </p:pic>
+      <p:pic>
+        <p:nvPicPr>
+          <p:cNvPr id="37" name="Picture 36">
+            <a:extLst>
+              <a:ext uri="{FF2B5EF4-FFF2-40B4-BE49-F238E27FC236}">
+                <a16:creationId xmlns:a16="http://schemas.microsoft.com/office/drawing/2014/main" id="{C6B48CBC-0B9D-48EB-A3F4-8396BA87A451}"/>
+              </a:ext>
+            </a:extLst>
+          </p:cNvPr>
+          <p:cNvPicPr>
+            <a:picLocks noChangeAspect="1"/>
+          </p:cNvPicPr>
+          <p:nvPr/>
+        </p:nvPicPr>
+        <p:blipFill>
+          <a:blip r:embed="rId10"/>
+          <a:stretch>
+            <a:fillRect/>
+          </a:stretch>
+        </p:blipFill>
+        <p:spPr>
+          <a:xfrm>
+            <a:off x="6970269" y="2132343"/>
+            <a:ext cx="5212080" cy="440924"/>
+          </a:xfrm>
+          <a:prstGeom prst="rect">
+            <a:avLst/>
+          </a:prstGeom>
+        </p:spPr>
+      </p:pic>
+      <p:cxnSp>
+        <p:nvCxnSpPr>
+          <p:cNvPr id="39" name="Straight Connector 38">
+            <a:extLst>
+              <a:ext uri="{FF2B5EF4-FFF2-40B4-BE49-F238E27FC236}">
+                <a16:creationId xmlns:a16="http://schemas.microsoft.com/office/drawing/2014/main" id="{3E9682EB-56C0-403E-ACD1-84852D7E294C}"/>
+              </a:ext>
+            </a:extLst>
+          </p:cNvPr>
+          <p:cNvCxnSpPr/>
+          <p:nvPr/>
+        </p:nvCxnSpPr>
+        <p:spPr bwMode="gray">
+          <a:xfrm>
+            <a:off x="0" y="2677364"/>
+            <a:ext cx="12182349" cy="0"/>
+          </a:xfrm>
+          <a:prstGeom prst="line">
+            <a:avLst/>
+          </a:prstGeom>
+          <a:ln>
+            <a:solidFill>
+              <a:schemeClr val="accent6"/>
+            </a:solidFill>
+          </a:ln>
+        </p:spPr>
+        <p:style>
+          <a:lnRef idx="1">
+            <a:schemeClr val="accent1"/>
+          </a:lnRef>
+          <a:fillRef idx="0">
+            <a:schemeClr val="accent1"/>
+          </a:fillRef>
+          <a:effectRef idx="0">
+            <a:schemeClr val="accent1"/>
+          </a:effectRef>
+          <a:fontRef idx="minor">
+            <a:schemeClr val="tx1"/>
+          </a:fontRef>
+        </p:style>
+      </p:cxnSp>
+      <p:cxnSp>
+        <p:nvCxnSpPr>
+          <p:cNvPr id="40" name="Straight Connector 39">
+            <a:extLst>
+              <a:ext uri="{FF2B5EF4-FFF2-40B4-BE49-F238E27FC236}">
+                <a16:creationId xmlns:a16="http://schemas.microsoft.com/office/drawing/2014/main" id="{DF4CD872-DA10-4FA6-8562-830982158134}"/>
+              </a:ext>
+            </a:extLst>
+          </p:cNvPr>
+          <p:cNvCxnSpPr/>
+          <p:nvPr/>
+        </p:nvCxnSpPr>
+        <p:spPr bwMode="gray">
+          <a:xfrm>
+            <a:off x="0" y="4352293"/>
+            <a:ext cx="12182349" cy="0"/>
+          </a:xfrm>
+          <a:prstGeom prst="line">
+            <a:avLst/>
+          </a:prstGeom>
+          <a:ln>
+            <a:solidFill>
+              <a:schemeClr val="accent6"/>
+            </a:solidFill>
+          </a:ln>
+        </p:spPr>
+        <p:style>
+          <a:lnRef idx="1">
+            <a:schemeClr val="accent1"/>
+          </a:lnRef>
+          <a:fillRef idx="0">
+            <a:schemeClr val="accent1"/>
+          </a:fillRef>
+          <a:effectRef idx="0">
+            <a:schemeClr val="accent1"/>
+          </a:effectRef>
+          <a:fontRef idx="minor">
+            <a:schemeClr val="tx1"/>
+          </a:fontRef>
+        </p:style>
+      </p:cxnSp>
     </p:spTree>
     <p:extLst>
       <p:ext uri="{BB962C8B-B14F-4D97-AF65-F5344CB8AC3E}">
@@ -20058,6 +21217,295 @@
   <p:clrMapOvr>
     <a:masterClrMapping/>
   </p:clrMapOvr>
+  <p:timing>
+    <p:tnLst>
+      <p:par>
+        <p:cTn id="1" dur="indefinite" restart="never" nodeType="tmRoot">
+          <p:childTnLst>
+            <p:seq concurrent="1" nextAc="seek">
+              <p:cTn id="2" dur="indefinite" nodeType="mainSeq">
+                <p:childTnLst>
+                  <p:par>
+                    <p:cTn id="3" fill="hold">
+                      <p:stCondLst>
+                        <p:cond delay="indefinite"/>
+                      </p:stCondLst>
+                      <p:childTnLst>
+                        <p:par>
+                          <p:cTn id="4" fill="hold">
+                            <p:stCondLst>
+                              <p:cond delay="0"/>
+                            </p:stCondLst>
+                            <p:childTnLst>
+                              <p:par>
+                                <p:cTn id="5" presetID="1" presetClass="entr" presetSubtype="0" fill="hold" grpId="0" nodeType="clickEffect">
+                                  <p:stCondLst>
+                                    <p:cond delay="0"/>
+                                  </p:stCondLst>
+                                  <p:childTnLst>
+                                    <p:set>
+                                      <p:cBhvr>
+                                        <p:cTn id="6" dur="1" fill="hold">
+                                          <p:stCondLst>
+                                            <p:cond delay="0"/>
+                                          </p:stCondLst>
+                                        </p:cTn>
+                                        <p:tgtEl>
+                                          <p:spTgt spid="16"/>
+                                        </p:tgtEl>
+                                        <p:attrNameLst>
+                                          <p:attrName>style.visibility</p:attrName>
+                                        </p:attrNameLst>
+                                      </p:cBhvr>
+                                      <p:to>
+                                        <p:strVal val="visible"/>
+                                      </p:to>
+                                    </p:set>
+                                  </p:childTnLst>
+                                </p:cTn>
+                              </p:par>
+                              <p:par>
+                                <p:cTn id="7" presetID="1" presetClass="entr" presetSubtype="0" fill="hold" nodeType="withEffect">
+                                  <p:stCondLst>
+                                    <p:cond delay="0"/>
+                                  </p:stCondLst>
+                                  <p:childTnLst>
+                                    <p:set>
+                                      <p:cBhvr>
+                                        <p:cTn id="8" dur="1" fill="hold">
+                                          <p:stCondLst>
+                                            <p:cond delay="0"/>
+                                          </p:stCondLst>
+                                        </p:cTn>
+                                        <p:tgtEl>
+                                          <p:spTgt spid="18"/>
+                                        </p:tgtEl>
+                                        <p:attrNameLst>
+                                          <p:attrName>style.visibility</p:attrName>
+                                        </p:attrNameLst>
+                                      </p:cBhvr>
+                                      <p:to>
+                                        <p:strVal val="visible"/>
+                                      </p:to>
+                                    </p:set>
+                                  </p:childTnLst>
+                                </p:cTn>
+                              </p:par>
+                              <p:par>
+                                <p:cTn id="9" presetID="1" presetClass="entr" presetSubtype="0" fill="hold" grpId="0" nodeType="withEffect">
+                                  <p:stCondLst>
+                                    <p:cond delay="0"/>
+                                  </p:stCondLst>
+                                  <p:childTnLst>
+                                    <p:set>
+                                      <p:cBhvr>
+                                        <p:cTn id="10" dur="1" fill="hold">
+                                          <p:stCondLst>
+                                            <p:cond delay="0"/>
+                                          </p:stCondLst>
+                                        </p:cTn>
+                                        <p:tgtEl>
+                                          <p:spTgt spid="22"/>
+                                        </p:tgtEl>
+                                        <p:attrNameLst>
+                                          <p:attrName>style.visibility</p:attrName>
+                                        </p:attrNameLst>
+                                      </p:cBhvr>
+                                      <p:to>
+                                        <p:strVal val="visible"/>
+                                      </p:to>
+                                    </p:set>
+                                  </p:childTnLst>
+                                </p:cTn>
+                              </p:par>
+                              <p:par>
+                                <p:cTn id="11" presetID="1" presetClass="entr" presetSubtype="0" fill="hold" grpId="0" nodeType="withEffect">
+                                  <p:stCondLst>
+                                    <p:cond delay="0"/>
+                                  </p:stCondLst>
+                                  <p:childTnLst>
+                                    <p:set>
+                                      <p:cBhvr>
+                                        <p:cTn id="12" dur="1" fill="hold">
+                                          <p:stCondLst>
+                                            <p:cond delay="0"/>
+                                          </p:stCondLst>
+                                        </p:cTn>
+                                        <p:tgtEl>
+                                          <p:spTgt spid="20"/>
+                                        </p:tgtEl>
+                                        <p:attrNameLst>
+                                          <p:attrName>style.visibility</p:attrName>
+                                        </p:attrNameLst>
+                                      </p:cBhvr>
+                                      <p:to>
+                                        <p:strVal val="visible"/>
+                                      </p:to>
+                                    </p:set>
+                                  </p:childTnLst>
+                                </p:cTn>
+                              </p:par>
+                            </p:childTnLst>
+                          </p:cTn>
+                        </p:par>
+                      </p:childTnLst>
+                    </p:cTn>
+                  </p:par>
+                  <p:par>
+                    <p:cTn id="13" fill="hold">
+                      <p:stCondLst>
+                        <p:cond delay="indefinite"/>
+                      </p:stCondLst>
+                      <p:childTnLst>
+                        <p:par>
+                          <p:cTn id="14" fill="hold">
+                            <p:stCondLst>
+                              <p:cond delay="0"/>
+                            </p:stCondLst>
+                            <p:childTnLst>
+                              <p:par>
+                                <p:cTn id="15" presetID="1" presetClass="entr" presetSubtype="0" fill="hold" nodeType="clickEffect">
+                                  <p:stCondLst>
+                                    <p:cond delay="0"/>
+                                  </p:stCondLst>
+                                  <p:childTnLst>
+                                    <p:set>
+                                      <p:cBhvr>
+                                        <p:cTn id="16" dur="1" fill="hold">
+                                          <p:stCondLst>
+                                            <p:cond delay="0"/>
+                                          </p:stCondLst>
+                                        </p:cTn>
+                                        <p:tgtEl>
+                                          <p:spTgt spid="10"/>
+                                        </p:tgtEl>
+                                        <p:attrNameLst>
+                                          <p:attrName>style.visibility</p:attrName>
+                                        </p:attrNameLst>
+                                      </p:cBhvr>
+                                      <p:to>
+                                        <p:strVal val="visible"/>
+                                      </p:to>
+                                    </p:set>
+                                  </p:childTnLst>
+                                </p:cTn>
+                              </p:par>
+                              <p:par>
+                                <p:cTn id="17" presetID="1" presetClass="entr" presetSubtype="0" fill="hold" grpId="0" nodeType="withEffect">
+                                  <p:stCondLst>
+                                    <p:cond delay="0"/>
+                                  </p:stCondLst>
+                                  <p:childTnLst>
+                                    <p:set>
+                                      <p:cBhvr>
+                                        <p:cTn id="18" dur="1" fill="hold">
+                                          <p:stCondLst>
+                                            <p:cond delay="0"/>
+                                          </p:stCondLst>
+                                        </p:cTn>
+                                        <p:tgtEl>
+                                          <p:spTgt spid="12"/>
+                                        </p:tgtEl>
+                                        <p:attrNameLst>
+                                          <p:attrName>style.visibility</p:attrName>
+                                        </p:attrNameLst>
+                                      </p:cBhvr>
+                                      <p:to>
+                                        <p:strVal val="visible"/>
+                                      </p:to>
+                                    </p:set>
+                                  </p:childTnLst>
+                                </p:cTn>
+                              </p:par>
+                              <p:par>
+                                <p:cTn id="19" presetID="1" presetClass="entr" presetSubtype="0" fill="hold" nodeType="withEffect">
+                                  <p:stCondLst>
+                                    <p:cond delay="0"/>
+                                  </p:stCondLst>
+                                  <p:childTnLst>
+                                    <p:set>
+                                      <p:cBhvr>
+                                        <p:cTn id="20" dur="1" fill="hold">
+                                          <p:stCondLst>
+                                            <p:cond delay="0"/>
+                                          </p:stCondLst>
+                                        </p:cTn>
+                                        <p:tgtEl>
+                                          <p:spTgt spid="8"/>
+                                        </p:tgtEl>
+                                        <p:attrNameLst>
+                                          <p:attrName>style.visibility</p:attrName>
+                                        </p:attrNameLst>
+                                      </p:cBhvr>
+                                      <p:to>
+                                        <p:strVal val="visible"/>
+                                      </p:to>
+                                    </p:set>
+                                  </p:childTnLst>
+                                </p:cTn>
+                              </p:par>
+                              <p:par>
+                                <p:cTn id="21" presetID="1" presetClass="entr" presetSubtype="0" fill="hold" grpId="0" nodeType="withEffect">
+                                  <p:stCondLst>
+                                    <p:cond delay="0"/>
+                                  </p:stCondLst>
+                                  <p:childTnLst>
+                                    <p:set>
+                                      <p:cBhvr>
+                                        <p:cTn id="22" dur="1" fill="hold">
+                                          <p:stCondLst>
+                                            <p:cond delay="0"/>
+                                          </p:stCondLst>
+                                        </p:cTn>
+                                        <p:tgtEl>
+                                          <p:spTgt spid="14"/>
+                                        </p:tgtEl>
+                                        <p:attrNameLst>
+                                          <p:attrName>style.visibility</p:attrName>
+                                        </p:attrNameLst>
+                                      </p:cBhvr>
+                                      <p:to>
+                                        <p:strVal val="visible"/>
+                                      </p:to>
+                                    </p:set>
+                                  </p:childTnLst>
+                                </p:cTn>
+                              </p:par>
+                            </p:childTnLst>
+                          </p:cTn>
+                        </p:par>
+                      </p:childTnLst>
+                    </p:cTn>
+                  </p:par>
+                </p:childTnLst>
+              </p:cTn>
+              <p:prevCondLst>
+                <p:cond evt="onPrev" delay="0">
+                  <p:tgtEl>
+                    <p:sldTgt/>
+                  </p:tgtEl>
+                </p:cond>
+              </p:prevCondLst>
+              <p:nextCondLst>
+                <p:cond evt="onNext" delay="0">
+                  <p:tgtEl>
+                    <p:sldTgt/>
+                  </p:tgtEl>
+                </p:cond>
+              </p:nextCondLst>
+            </p:seq>
+          </p:childTnLst>
+        </p:cTn>
+      </p:par>
+    </p:tnLst>
+    <p:bldLst>
+      <p:bldP spid="12" grpId="0"/>
+      <p:bldP spid="14" grpId="0"/>
+      <p:bldP spid="16" grpId="0"/>
+      <p:bldP spid="20" grpId="0"/>
+      <p:bldP spid="22" grpId="0"/>
+    </p:bldLst>
+  </p:timing>
 </p:sld>
 </file>
 

</xml_diff>